<commit_message>
add sequence Diagram and update in some things
</commit_message>
<xml_diff>
--- a/Graduation_Project_First_Term.pptx
+++ b/Graduation_Project_First_Term.pptx
@@ -5,7 +5,7 @@
     <p:sldMasterId id="2147483648" r:id="rId1"/>
   </p:sldMasterIdLst>
   <p:notesMasterIdLst>
-    <p:notesMasterId r:id="rId22"/>
+    <p:notesMasterId r:id="rId25"/>
   </p:notesMasterIdLst>
   <p:sldIdLst>
     <p:sldId id="256" r:id="rId2"/>
@@ -26,13 +26,16 @@
     <p:sldId id="282" r:id="rId17"/>
     <p:sldId id="284" r:id="rId18"/>
     <p:sldId id="285" r:id="rId19"/>
-    <p:sldId id="286" r:id="rId20"/>
-    <p:sldId id="257" r:id="rId21"/>
+    <p:sldId id="287" r:id="rId20"/>
+    <p:sldId id="288" r:id="rId21"/>
+    <p:sldId id="289" r:id="rId22"/>
+    <p:sldId id="286" r:id="rId23"/>
+    <p:sldId id="257" r:id="rId24"/>
   </p:sldIdLst>
   <p:sldSz cx="12192000" cy="6858000"/>
   <p:notesSz cx="6858000" cy="9144000"/>
   <p:custDataLst>
-    <p:tags r:id="rId23"/>
+    <p:tags r:id="rId26"/>
   </p:custDataLst>
   <p:defaultTextStyle>
     <a:defPPr>
@@ -230,7 +233,7 @@
           <a:p>
             <a:fld id="{83022CBF-43D6-46F5-B57B-60264FF51F10}" type="datetimeFigureOut">
               <a:rPr lang="zh-CN" altLang="en-US" smtClean="0"/>
-              <a:t>2024/2/9</a:t>
+              <a:t>2024/2/11</a:t>
             </a:fld>
             <a:endParaRPr lang="zh-CN" altLang="en-US"/>
           </a:p>
@@ -922,7 +925,7 @@
           <a:p>
             <a:fld id="{F5987BF4-016C-420C-9319-4A8131913F32}" type="slidenum">
               <a:rPr lang="zh-CN" altLang="en-US" smtClean="0"/>
-              <a:t>20</a:t>
+              <a:t>23</a:t>
             </a:fld>
             <a:endParaRPr lang="zh-CN" altLang="en-US"/>
           </a:p>
@@ -1861,7 +1864,7 @@
           <a:p>
             <a:fld id="{4A2C6F17-E8DF-4AC4-A987-47B82A6FC001}" type="datetimeFigureOut">
               <a:rPr lang="zh-CN" altLang="en-US" smtClean="0"/>
-              <a:t>2024/2/9</a:t>
+              <a:t>2024/2/11</a:t>
             </a:fld>
             <a:endParaRPr lang="zh-CN" altLang="en-US"/>
           </a:p>
@@ -2081,7 +2084,7 @@
           <a:p>
             <a:fld id="{4A2C6F17-E8DF-4AC4-A987-47B82A6FC001}" type="datetimeFigureOut">
               <a:rPr lang="zh-CN" altLang="en-US" smtClean="0"/>
-              <a:t>2024/2/9</a:t>
+              <a:t>2024/2/11</a:t>
             </a:fld>
             <a:endParaRPr lang="zh-CN" altLang="en-US"/>
           </a:p>
@@ -2605,7 +2608,7 @@
           <a:p>
             <a:fld id="{4A2C6F17-E8DF-4AC4-A987-47B82A6FC001}" type="datetimeFigureOut">
               <a:rPr lang="zh-CN" altLang="en-US" smtClean="0"/>
-              <a:t>2024/2/9</a:t>
+              <a:t>2024/2/11</a:t>
             </a:fld>
             <a:endParaRPr lang="zh-CN" altLang="en-US"/>
           </a:p>
@@ -3029,7 +3032,7 @@
           <a:p>
             <a:fld id="{4A2C6F17-E8DF-4AC4-A987-47B82A6FC001}" type="datetimeFigureOut">
               <a:rPr lang="zh-CN" altLang="en-US" smtClean="0"/>
-              <a:t>2024/2/9</a:t>
+              <a:t>2024/2/11</a:t>
             </a:fld>
             <a:endParaRPr lang="zh-CN" altLang="en-US"/>
           </a:p>
@@ -3182,7 +3185,7 @@
           <a:p>
             <a:fld id="{4A2C6F17-E8DF-4AC4-A987-47B82A6FC001}" type="datetimeFigureOut">
               <a:rPr lang="zh-CN" altLang="en-US" smtClean="0"/>
-              <a:t>2024/2/9</a:t>
+              <a:t>2024/2/11</a:t>
             </a:fld>
             <a:endParaRPr lang="zh-CN" altLang="en-US"/>
           </a:p>
@@ -3307,7 +3310,7 @@
           <a:p>
             <a:fld id="{4A2C6F17-E8DF-4AC4-A987-47B82A6FC001}" type="datetimeFigureOut">
               <a:rPr lang="zh-CN" altLang="en-US" smtClean="0"/>
-              <a:t>2024/2/9</a:t>
+              <a:t>2024/2/11</a:t>
             </a:fld>
             <a:endParaRPr lang="zh-CN" altLang="en-US"/>
           </a:p>
@@ -3630,7 +3633,7 @@
           <a:p>
             <a:fld id="{4A2C6F17-E8DF-4AC4-A987-47B82A6FC001}" type="datetimeFigureOut">
               <a:rPr lang="zh-CN" altLang="en-US" smtClean="0"/>
-              <a:t>2024/2/9</a:t>
+              <a:t>2024/2/11</a:t>
             </a:fld>
             <a:endParaRPr lang="zh-CN" altLang="en-US"/>
           </a:p>
@@ -3930,7 +3933,7 @@
           <a:p>
             <a:fld id="{4A2C6F17-E8DF-4AC4-A987-47B82A6FC001}" type="datetimeFigureOut">
               <a:rPr lang="zh-CN" altLang="en-US" smtClean="0"/>
-              <a:t>2024/2/9</a:t>
+              <a:t>2024/2/11</a:t>
             </a:fld>
             <a:endParaRPr lang="zh-CN" altLang="en-US"/>
           </a:p>
@@ -4183,7 +4186,7 @@
           <a:p>
             <a:fld id="{4A2C6F17-E8DF-4AC4-A987-47B82A6FC001}" type="datetimeFigureOut">
               <a:rPr lang="zh-CN" altLang="en-US" smtClean="0"/>
-              <a:t>2024/2/9</a:t>
+              <a:t>2024/2/11</a:t>
             </a:fld>
             <a:endParaRPr lang="zh-CN" altLang="en-US"/>
           </a:p>
@@ -7671,7 +7674,7 @@
           <p:nvPr/>
         </p:nvPicPr>
         <p:blipFill>
-          <a:blip r:embed="rId3">
+          <a:blip r:embed="rId3" cstate="hqprint">
             <a:extLst>
               <a:ext uri="{28A0092B-C50C-407E-A947-70E740481C1C}">
                 <a14:useLocalDpi xmlns:a14="http://schemas.microsoft.com/office/drawing/2010/main" val="0"/>
@@ -7806,7 +7809,7 @@
           <p:nvPr/>
         </p:nvPicPr>
         <p:blipFill>
-          <a:blip r:embed="rId4">
+          <a:blip r:embed="rId4" cstate="hqprint">
             <a:extLst>
               <a:ext uri="{28A0092B-C50C-407E-A947-70E740481C1C}">
                 <a14:useLocalDpi xmlns:a14="http://schemas.microsoft.com/office/drawing/2010/main" val="0"/>
@@ -7916,7 +7919,7 @@
           <p:nvPr/>
         </p:nvPicPr>
         <p:blipFill>
-          <a:blip r:embed="rId5">
+          <a:blip r:embed="rId5" cstate="hqprint">
             <a:extLst>
               <a:ext uri="{28A0092B-C50C-407E-A947-70E740481C1C}">
                 <a14:useLocalDpi xmlns:a14="http://schemas.microsoft.com/office/drawing/2010/main" val="0"/>
@@ -8156,7 +8159,7 @@
           <p:nvPr/>
         </p:nvPicPr>
         <p:blipFill>
-          <a:blip r:embed="rId6">
+          <a:blip r:embed="rId6" cstate="hqprint">
             <a:extLst>
               <a:ext uri="{28A0092B-C50C-407E-A947-70E740481C1C}">
                 <a14:useLocalDpi xmlns:a14="http://schemas.microsoft.com/office/drawing/2010/main" val="0"/>
@@ -8192,7 +8195,7 @@
           <p:nvPr/>
         </p:nvPicPr>
         <p:blipFill>
-          <a:blip r:embed="rId7">
+          <a:blip r:embed="rId7" cstate="hqprint">
             <a:extLst>
               <a:ext uri="{28A0092B-C50C-407E-A947-70E740481C1C}">
                 <a14:useLocalDpi xmlns:a14="http://schemas.microsoft.com/office/drawing/2010/main" val="0"/>
@@ -14264,19 +14267,13 @@
       </p:pic>
       <p:pic>
         <p:nvPicPr>
-          <p:cNvPr id="9" name="Picture 8">
-            <a:extLst>
-              <a:ext uri="{FF2B5EF4-FFF2-40B4-BE49-F238E27FC236}">
-                <a16:creationId xmlns:a16="http://schemas.microsoft.com/office/drawing/2014/main" id="{5D301F2B-98C3-8565-DAAD-74DC8E5C7B61}"/>
-              </a:ext>
-            </a:extLst>
-          </p:cNvPr>
+          <p:cNvPr id="11" name="Picture 10"/>
           <p:cNvPicPr>
             <a:picLocks noChangeAspect="1"/>
           </p:cNvPicPr>
           <p:nvPr/>
         </p:nvPicPr>
-        <p:blipFill rotWithShape="1">
+        <p:blipFill>
           <a:blip r:embed="rId4">
             <a:extLst>
               <a:ext uri="{28A0092B-C50C-407E-A947-70E740481C1C}">
@@ -14284,13 +14281,14 @@
               </a:ext>
             </a:extLst>
           </a:blip>
-          <a:srcRect l="17441" r="21034" b="3033"/>
-          <a:stretch/>
+          <a:stretch>
+            <a:fillRect/>
+          </a:stretch>
         </p:blipFill>
         <p:spPr>
           <a:xfrm>
-            <a:off x="8159262" y="1122595"/>
-            <a:ext cx="4032738" cy="5404814"/>
+            <a:off x="8159261" y="1009319"/>
+            <a:ext cx="3643533" cy="5367612"/>
           </a:xfrm>
           <a:prstGeom prst="rect">
             <a:avLst/>
@@ -14426,7 +14424,7 @@
                                           </p:stCondLst>
                                         </p:cTn>
                                         <p:tgtEl>
-                                          <p:spTgt spid="9"/>
+                                          <p:spTgt spid="7"/>
                                         </p:tgtEl>
                                         <p:attrNameLst>
                                           <p:attrName>style.visibility</p:attrName>
@@ -14440,7 +14438,7 @@
                                       <p:cBhvr>
                                         <p:cTn id="13" dur="500"/>
                                         <p:tgtEl>
-                                          <p:spTgt spid="9"/>
+                                          <p:spTgt spid="7"/>
                                         </p:tgtEl>
                                       </p:cBhvr>
                                     </p:animEffect>
@@ -14448,7 +14446,7 @@
                                 </p:cTn>
                               </p:par>
                               <p:par>
-                                <p:cTn id="14" presetID="16" presetClass="entr" presetSubtype="21" fill="hold" nodeType="withEffect">
+                                <p:cTn id="14" presetID="10" presetClass="entr" presetSubtype="0" fill="hold" nodeType="withEffect">
                                   <p:stCondLst>
                                     <p:cond delay="0"/>
                                   </p:stCondLst>
@@ -14461,7 +14459,7 @@
                                           </p:stCondLst>
                                         </p:cTn>
                                         <p:tgtEl>
-                                          <p:spTgt spid="7"/>
+                                          <p:spTgt spid="11"/>
                                         </p:tgtEl>
                                         <p:attrNameLst>
                                           <p:attrName>style.visibility</p:attrName>
@@ -14471,11 +14469,11 @@
                                         <p:strVal val="visible"/>
                                       </p:to>
                                     </p:set>
-                                    <p:animEffect transition="in" filter="barn(inVertical)">
+                                    <p:animEffect transition="in" filter="fade">
                                       <p:cBhvr>
                                         <p:cTn id="16" dur="500"/>
                                         <p:tgtEl>
-                                          <p:spTgt spid="7"/>
+                                          <p:spTgt spid="11"/>
                                         </p:tgtEl>
                                       </p:cBhvr>
                                     </p:animEffect>
@@ -14837,13 +14835,13 @@
   <p:clrMapOvr>
     <a:masterClrMapping/>
   </p:clrMapOvr>
-  <mc:AlternateContent xmlns:mc="http://schemas.openxmlformats.org/markup-compatibility/2006">
-    <mc:Choice xmlns:p14="http://schemas.microsoft.com/office/powerpoint/2010/main" Requires="p14">
+  <mc:AlternateContent xmlns:mc="http://schemas.openxmlformats.org/markup-compatibility/2006" xmlns:p14="http://schemas.microsoft.com/office/powerpoint/2010/main">
+    <mc:Choice Requires="p14">
       <p:transition spd="slow" p14:dur="1500">
         <p:random/>
       </p:transition>
     </mc:Choice>
-    <mc:Fallback>
+    <mc:Fallback xmlns="">
       <p:transition spd="slow">
         <p:random/>
       </p:transition>
@@ -15065,7 +15063,7 @@
           <p:cNvPr id="2" name="组合 1">
             <a:extLst>
               <a:ext uri="{FF2B5EF4-FFF2-40B4-BE49-F238E27FC236}">
-                <a16:creationId xmlns:a16="http://schemas.microsoft.com/office/drawing/2014/main" id="{9E1CC22B-EC6A-4899-D6E1-10F9DE2ACA56}"/>
+                <a16:creationId xmlns:a16="http://schemas.microsoft.com/office/drawing/2014/main" id="{6118A8EF-A4DE-A4AC-3630-D3E56151BE70}"/>
               </a:ext>
             </a:extLst>
           </p:cNvPr>
@@ -15074,10 +15072,10 @@
         </p:nvGrpSpPr>
         <p:grpSpPr>
           <a:xfrm>
-            <a:off x="0" y="377294"/>
-            <a:ext cx="5213167" cy="392623"/>
-            <a:chOff x="455162" y="524592"/>
-            <a:chExt cx="5213167" cy="392623"/>
+            <a:off x="4041668" y="514829"/>
+            <a:ext cx="5538430" cy="380269"/>
+            <a:chOff x="567034" y="536946"/>
+            <a:chExt cx="5538430" cy="380269"/>
           </a:xfrm>
         </p:grpSpPr>
         <p:sp>
@@ -15085,7 +15083,7 @@
             <p:cNvPr id="3" name="文本框 2">
               <a:extLst>
                 <a:ext uri="{FF2B5EF4-FFF2-40B4-BE49-F238E27FC236}">
-                  <a16:creationId xmlns:a16="http://schemas.microsoft.com/office/drawing/2014/main" id="{FC6F568C-911E-6377-8EE4-3E553B1BE525}"/>
+                  <a16:creationId xmlns:a16="http://schemas.microsoft.com/office/drawing/2014/main" id="{830D39AA-5A0A-4E89-E2B4-80F646E2BAA0}"/>
                 </a:ext>
               </a:extLst>
             </p:cNvPr>
@@ -15094,8 +15092,8 @@
           </p:nvSpPr>
           <p:spPr>
             <a:xfrm>
-              <a:off x="455162" y="524592"/>
-              <a:ext cx="5213167" cy="369332"/>
+              <a:off x="585790" y="536946"/>
+              <a:ext cx="5519674" cy="369332"/>
             </a:xfrm>
             <a:prstGeom prst="rect">
               <a:avLst/>
@@ -15114,7 +15112,7 @@
                   <a:latin typeface="Yeseva One" panose="00000500000000000000" pitchFamily="2" charset="0"/>
                   <a:ea typeface="字魂5号-无外润黑体" panose="00000500000000000000" pitchFamily="2" charset="-122"/>
                 </a:rPr>
-                <a:t>System Analysis and design : Class Diagram</a:t>
+                <a:t>System Analysis and design : sequence Diagram-1</a:t>
               </a:r>
             </a:p>
           </p:txBody>
@@ -15124,7 +15122,7 @@
             <p:cNvPr id="4" name="组合 3">
               <a:extLst>
                 <a:ext uri="{FF2B5EF4-FFF2-40B4-BE49-F238E27FC236}">
-                  <a16:creationId xmlns:a16="http://schemas.microsoft.com/office/drawing/2014/main" id="{06CFFE25-C379-D67F-48F0-3E8E2163C546}"/>
+                  <a16:creationId xmlns:a16="http://schemas.microsoft.com/office/drawing/2014/main" id="{6F088C38-C505-7951-72AF-C9CE579B6977}"/>
                 </a:ext>
               </a:extLst>
             </p:cNvPr>
@@ -15144,7 +15142,7 @@
               <p:cNvPr id="5" name="直接连接符 4">
                 <a:extLst>
                   <a:ext uri="{FF2B5EF4-FFF2-40B4-BE49-F238E27FC236}">
-                    <a16:creationId xmlns:a16="http://schemas.microsoft.com/office/drawing/2014/main" id="{31DC2C05-3814-F618-5485-A4CE6F3F9116}"/>
+                    <a16:creationId xmlns:a16="http://schemas.microsoft.com/office/drawing/2014/main" id="{E587C9EA-015D-AA7F-3E93-5654D3C50EA7}"/>
                   </a:ext>
                 </a:extLst>
               </p:cNvPr>
@@ -15187,7 +15185,7 @@
               <p:cNvPr id="6" name="矩形: 圆角 5">
                 <a:extLst>
                   <a:ext uri="{FF2B5EF4-FFF2-40B4-BE49-F238E27FC236}">
-                    <a16:creationId xmlns:a16="http://schemas.microsoft.com/office/drawing/2014/main" id="{39A3C9FA-9095-5A66-78A4-EAF88CC5E6A5}"/>
+                    <a16:creationId xmlns:a16="http://schemas.microsoft.com/office/drawing/2014/main" id="{58B0EC72-0D72-AD16-6E9E-19CE91D1B460}"/>
                   </a:ext>
                 </a:extLst>
               </p:cNvPr>
@@ -15254,10 +15252,45 @@
       </p:grpSp>
       <p:pic>
         <p:nvPicPr>
-          <p:cNvPr id="11" name="Picture 10">
+          <p:cNvPr id="13" name="Picture 12">
             <a:extLst>
               <a:ext uri="{FF2B5EF4-FFF2-40B4-BE49-F238E27FC236}">
-                <a16:creationId xmlns:a16="http://schemas.microsoft.com/office/drawing/2014/main" id="{5D649D99-50C8-6EFE-91BD-0A6865124945}"/>
+                <a16:creationId xmlns:a16="http://schemas.microsoft.com/office/drawing/2014/main" id="{70E3094D-12C2-4A0E-5350-E104C6615C96}"/>
+              </a:ext>
+            </a:extLst>
+          </p:cNvPr>
+          <p:cNvPicPr>
+            <a:picLocks noChangeAspect="1"/>
+          </p:cNvPicPr>
+          <p:nvPr/>
+        </p:nvPicPr>
+        <p:blipFill rotWithShape="1">
+          <a:blip r:embed="rId2">
+            <a:extLst>
+              <a:ext uri="{28A0092B-C50C-407E-A947-70E740481C1C}">
+                <a14:useLocalDpi xmlns:a14="http://schemas.microsoft.com/office/drawing/2010/main" val="0"/>
+              </a:ext>
+            </a:extLst>
+          </a:blip>
+          <a:srcRect r="4722"/>
+          <a:stretch/>
+        </p:blipFill>
+        <p:spPr>
+          <a:xfrm>
+            <a:off x="292019" y="1292671"/>
+            <a:ext cx="4842689" cy="5150331"/>
+          </a:xfrm>
+          <a:prstGeom prst="rect">
+            <a:avLst/>
+          </a:prstGeom>
+        </p:spPr>
+      </p:pic>
+      <p:pic>
+        <p:nvPicPr>
+          <p:cNvPr id="15" name="Picture 14">
+            <a:extLst>
+              <a:ext uri="{FF2B5EF4-FFF2-40B4-BE49-F238E27FC236}">
+                <a16:creationId xmlns:a16="http://schemas.microsoft.com/office/drawing/2014/main" id="{322506B3-CB4D-040A-D215-8BA86C58998D}"/>
               </a:ext>
             </a:extLst>
           </p:cNvPr>
@@ -15267,7 +15300,7 @@
           <p:nvPr/>
         </p:nvPicPr>
         <p:blipFill>
-          <a:blip r:embed="rId2">
+          <a:blip r:embed="rId3">
             <a:extLst>
               <a:ext uri="{28A0092B-C50C-407E-A947-70E740481C1C}">
                 <a14:useLocalDpi xmlns:a14="http://schemas.microsoft.com/office/drawing/2010/main" val="0"/>
@@ -15280,18 +15313,83 @@
         </p:blipFill>
         <p:spPr>
           <a:xfrm>
-            <a:off x="4862285" y="467783"/>
-            <a:ext cx="6075823" cy="5922434"/>
+            <a:off x="6025661" y="1505609"/>
+            <a:ext cx="5411373" cy="4937393"/>
           </a:xfrm>
           <a:prstGeom prst="rect">
             <a:avLst/>
           </a:prstGeom>
         </p:spPr>
       </p:pic>
+      <p:sp>
+        <p:nvSpPr>
+          <p:cNvPr id="16" name="TextBox 15">
+            <a:extLst>
+              <a:ext uri="{FF2B5EF4-FFF2-40B4-BE49-F238E27FC236}">
+                <a16:creationId xmlns:a16="http://schemas.microsoft.com/office/drawing/2014/main" id="{D10005D6-47C9-E219-DB4A-20279E3CD6E5}"/>
+              </a:ext>
+            </a:extLst>
+          </p:cNvPr>
+          <p:cNvSpPr txBox="1"/>
+          <p:nvPr/>
+        </p:nvSpPr>
+        <p:spPr>
+          <a:xfrm>
+            <a:off x="292019" y="571932"/>
+            <a:ext cx="3365581" cy="646331"/>
+          </a:xfrm>
+          <a:prstGeom prst="rect">
+            <a:avLst/>
+          </a:prstGeom>
+          <a:solidFill>
+            <a:schemeClr val="accent5">
+              <a:lumMod val="20000"/>
+              <a:lumOff val="80000"/>
+            </a:schemeClr>
+          </a:solidFill>
+        </p:spPr>
+        <p:txBody>
+          <a:bodyPr wrap="square" rtlCol="1">
+            <a:spAutoFit/>
+          </a:bodyPr>
+          <a:lstStyle/>
+          <a:p>
+            <a:r>
+              <a:rPr lang="en-US" dirty="0">
+                <a:ln w="0"/>
+                <a:solidFill>
+                  <a:schemeClr val="accent1"/>
+                </a:solidFill>
+                <a:effectLst>
+                  <a:outerShdw blurRad="38100" dist="25400" dir="5400000" algn="ctr" rotWithShape="0">
+                    <a:srgbClr val="6E747A">
+                      <a:alpha val="43000"/>
+                    </a:srgbClr>
+                  </a:outerShdw>
+                </a:effectLst>
+              </a:rPr>
+              <a:t>Admin: manage Accounts  Sequence Diagram</a:t>
+            </a:r>
+            <a:endParaRPr lang="ar-EG" dirty="0">
+              <a:ln w="0"/>
+              <a:solidFill>
+                <a:schemeClr val="accent1"/>
+              </a:solidFill>
+              <a:effectLst>
+                <a:outerShdw blurRad="38100" dist="25400" dir="5400000" algn="ctr" rotWithShape="0">
+                  <a:srgbClr val="6E747A">
+                    <a:alpha val="43000"/>
+                  </a:srgbClr>
+                </a:outerShdw>
+              </a:effectLst>
+            </a:endParaRPr>
+          </a:p>
+        </p:txBody>
+      </p:sp>
     </p:spTree>
     <p:extLst>
       <p:ext uri="{BB962C8B-B14F-4D97-AF65-F5344CB8AC3E}">
-        <p14:creationId xmlns:p14="http://schemas.microsoft.com/office/powerpoint/2010/main" val="36411758"/>
+        <p14:creationId xmlns:p14="http://schemas.microsoft.com/office/powerpoint/2010/main" val="3708867860"/>
       </p:ext>
     </p:extLst>
   </p:cSld>
@@ -15369,7 +15467,7 @@
                                 </p:cTn>
                               </p:par>
                               <p:par>
-                                <p:cTn id="8" presetID="16" presetClass="entr" presetSubtype="21" fill="hold" nodeType="withEffect">
+                                <p:cTn id="8" presetID="10" presetClass="entr" presetSubtype="0" fill="hold" grpId="0" nodeType="withEffect">
                                   <p:stCondLst>
                                     <p:cond delay="0"/>
                                   </p:stCondLst>
@@ -15382,7 +15480,7 @@
                                           </p:stCondLst>
                                         </p:cTn>
                                         <p:tgtEl>
-                                          <p:spTgt spid="11"/>
+                                          <p:spTgt spid="16"/>
                                         </p:tgtEl>
                                         <p:attrNameLst>
                                           <p:attrName>style.visibility</p:attrName>
@@ -15392,11 +15490,11 @@
                                         <p:strVal val="visible"/>
                                       </p:to>
                                     </p:set>
-                                    <p:animEffect transition="in" filter="barn(inVertical)">
+                                    <p:animEffect transition="in" filter="fade">
                                       <p:cBhvr>
                                         <p:cTn id="10" dur="500"/>
                                         <p:tgtEl>
-                                          <p:spTgt spid="11"/>
+                                          <p:spTgt spid="16"/>
                                         </p:tgtEl>
                                       </p:cBhvr>
                                     </p:animEffect>
@@ -15430,6 +15528,9 @@
         </p:cTn>
       </p:par>
     </p:tnLst>
+    <p:bldLst>
+      <p:bldP spid="16" grpId="0" animBg="1"/>
+    </p:bldLst>
   </p:timing>
 </p:sld>
 </file>
@@ -16253,6 +16354,1350 @@
 </file>
 
 <file path=ppt/slides/slide20.xml><?xml version="1.0" encoding="utf-8"?>
+<p:sld xmlns:a="http://schemas.openxmlformats.org/drawingml/2006/main" xmlns:r="http://schemas.openxmlformats.org/officeDocument/2006/relationships" xmlns:p="http://schemas.openxmlformats.org/presentationml/2006/main">
+  <p:cSld>
+    <p:spTree>
+      <p:nvGrpSpPr>
+        <p:cNvPr id="1" name=""/>
+        <p:cNvGrpSpPr/>
+        <p:nvPr/>
+      </p:nvGrpSpPr>
+      <p:grpSpPr>
+        <a:xfrm>
+          <a:off x="0" y="0"/>
+          <a:ext cx="0" cy="0"/>
+          <a:chOff x="0" y="0"/>
+          <a:chExt cx="0" cy="0"/>
+        </a:xfrm>
+      </p:grpSpPr>
+      <p:grpSp>
+        <p:nvGrpSpPr>
+          <p:cNvPr id="7" name="组合 1">
+            <a:extLst>
+              <a:ext uri="{FF2B5EF4-FFF2-40B4-BE49-F238E27FC236}">
+                <a16:creationId xmlns:a16="http://schemas.microsoft.com/office/drawing/2014/main" id="{6A25122D-58D5-A208-83A2-FA84914F8922}"/>
+              </a:ext>
+            </a:extLst>
+          </p:cNvPr>
+          <p:cNvGrpSpPr/>
+          <p:nvPr/>
+        </p:nvGrpSpPr>
+        <p:grpSpPr>
+          <a:xfrm>
+            <a:off x="3844721" y="472626"/>
+            <a:ext cx="5538430" cy="380269"/>
+            <a:chOff x="567034" y="536946"/>
+            <a:chExt cx="5538430" cy="380269"/>
+          </a:xfrm>
+        </p:grpSpPr>
+        <p:sp>
+          <p:nvSpPr>
+            <p:cNvPr id="8" name="文本框 2">
+              <a:extLst>
+                <a:ext uri="{FF2B5EF4-FFF2-40B4-BE49-F238E27FC236}">
+                  <a16:creationId xmlns:a16="http://schemas.microsoft.com/office/drawing/2014/main" id="{C2A4AA71-C788-1B08-51D2-3744D0F67F66}"/>
+                </a:ext>
+              </a:extLst>
+            </p:cNvPr>
+            <p:cNvSpPr txBox="1"/>
+            <p:nvPr/>
+          </p:nvSpPr>
+          <p:spPr>
+            <a:xfrm>
+              <a:off x="585790" y="536946"/>
+              <a:ext cx="5519674" cy="369332"/>
+            </a:xfrm>
+            <a:prstGeom prst="rect">
+              <a:avLst/>
+            </a:prstGeom>
+            <a:noFill/>
+          </p:spPr>
+          <p:txBody>
+            <a:bodyPr wrap="square" rtlCol="0">
+              <a:spAutoFit/>
+            </a:bodyPr>
+            <a:lstStyle/>
+            <a:p>
+              <a:pPr algn="ctr"/>
+              <a:r>
+                <a:rPr lang="en-US" altLang="zh-CN" sz="1800" dirty="0">
+                  <a:latin typeface="Yeseva One" panose="00000500000000000000" pitchFamily="2" charset="0"/>
+                  <a:ea typeface="字魂5号-无外润黑体" panose="00000500000000000000" pitchFamily="2" charset="-122"/>
+                </a:rPr>
+                <a:t>System Analysis and design : sequence Diagram-2</a:t>
+              </a:r>
+            </a:p>
+          </p:txBody>
+        </p:sp>
+        <p:grpSp>
+          <p:nvGrpSpPr>
+            <p:cNvPr id="9" name="组合 3">
+              <a:extLst>
+                <a:ext uri="{FF2B5EF4-FFF2-40B4-BE49-F238E27FC236}">
+                  <a16:creationId xmlns:a16="http://schemas.microsoft.com/office/drawing/2014/main" id="{ECDC5A35-7CB0-C21A-884C-C3DA1FFDD551}"/>
+                </a:ext>
+              </a:extLst>
+            </p:cNvPr>
+            <p:cNvGrpSpPr/>
+            <p:nvPr/>
+          </p:nvGrpSpPr>
+          <p:grpSpPr>
+            <a:xfrm>
+              <a:off x="567034" y="554816"/>
+              <a:ext cx="3945816" cy="362399"/>
+              <a:chOff x="567034" y="554816"/>
+              <a:chExt cx="3945816" cy="362399"/>
+            </a:xfrm>
+          </p:grpSpPr>
+          <p:cxnSp>
+            <p:nvCxnSpPr>
+              <p:cNvPr id="10" name="直接连接符 4">
+                <a:extLst>
+                  <a:ext uri="{FF2B5EF4-FFF2-40B4-BE49-F238E27FC236}">
+                    <a16:creationId xmlns:a16="http://schemas.microsoft.com/office/drawing/2014/main" id="{D252292B-6605-422D-7B77-8864E4B40D29}"/>
+                  </a:ext>
+                </a:extLst>
+              </p:cNvPr>
+              <p:cNvCxnSpPr>
+                <a:cxnSpLocks/>
+              </p:cNvCxnSpPr>
+              <p:nvPr/>
+            </p:nvCxnSpPr>
+            <p:spPr>
+              <a:xfrm>
+                <a:off x="798051" y="900706"/>
+                <a:ext cx="3714799" cy="0"/>
+              </a:xfrm>
+              <a:prstGeom prst="line">
+                <a:avLst/>
+              </a:prstGeom>
+              <a:ln w="15875">
+                <a:solidFill>
+                  <a:srgbClr val="1671C2"/>
+                </a:solidFill>
+              </a:ln>
+            </p:spPr>
+            <p:style>
+              <a:lnRef idx="1">
+                <a:schemeClr val="accent1"/>
+              </a:lnRef>
+              <a:fillRef idx="0">
+                <a:schemeClr val="accent1"/>
+              </a:fillRef>
+              <a:effectRef idx="0">
+                <a:schemeClr val="accent1"/>
+              </a:effectRef>
+              <a:fontRef idx="minor">
+                <a:schemeClr val="tx1"/>
+              </a:fontRef>
+            </p:style>
+          </p:cxnSp>
+          <p:sp>
+            <p:nvSpPr>
+              <p:cNvPr id="11" name="矩形: 圆角 5">
+                <a:extLst>
+                  <a:ext uri="{FF2B5EF4-FFF2-40B4-BE49-F238E27FC236}">
+                    <a16:creationId xmlns:a16="http://schemas.microsoft.com/office/drawing/2014/main" id="{B3858BAC-3E2A-A9AE-2675-061B7506C303}"/>
+                  </a:ext>
+                </a:extLst>
+              </p:cNvPr>
+              <p:cNvSpPr/>
+              <p:nvPr/>
+            </p:nvSpPr>
+            <p:spPr>
+              <a:xfrm>
+                <a:off x="567034" y="554816"/>
+                <a:ext cx="362314" cy="362399"/>
+              </a:xfrm>
+              <a:prstGeom prst="roundRect">
+                <a:avLst/>
+              </a:prstGeom>
+              <a:solidFill>
+                <a:srgbClr val="1671C2"/>
+              </a:solidFill>
+              <a:ln>
+                <a:noFill/>
+              </a:ln>
+            </p:spPr>
+            <p:style>
+              <a:lnRef idx="2">
+                <a:schemeClr val="accent1">
+                  <a:shade val="50000"/>
+                </a:schemeClr>
+              </a:lnRef>
+              <a:fillRef idx="1">
+                <a:schemeClr val="accent1"/>
+              </a:fillRef>
+              <a:effectRef idx="0">
+                <a:schemeClr val="accent1"/>
+              </a:effectRef>
+              <a:fontRef idx="minor">
+                <a:schemeClr val="lt1"/>
+              </a:fontRef>
+            </p:style>
+            <p:txBody>
+              <a:bodyPr rtlCol="0" anchor="ctr"/>
+              <a:lstStyle/>
+              <a:p>
+                <a:pPr algn="ctr"/>
+                <a:r>
+                  <a:rPr lang="en-US" altLang="zh-CN" dirty="0">
+                    <a:solidFill>
+                      <a:schemeClr val="bg1"/>
+                    </a:solidFill>
+                    <a:latin typeface="Yeseva One" panose="00000500000000000000" pitchFamily="2" charset="0"/>
+                    <a:ea typeface="字魂5号-无外润黑体" panose="00000500000000000000" pitchFamily="2" charset="-122"/>
+                  </a:rPr>
+                  <a:t>4</a:t>
+                </a:r>
+                <a:endParaRPr lang="zh-CN" altLang="en-US" dirty="0">
+                  <a:solidFill>
+                    <a:schemeClr val="bg1"/>
+                  </a:solidFill>
+                  <a:latin typeface="Yeseva One" panose="00000500000000000000" pitchFamily="2" charset="0"/>
+                  <a:ea typeface="字魂5号-无外润黑体" panose="00000500000000000000" pitchFamily="2" charset="-122"/>
+                </a:endParaRPr>
+              </a:p>
+            </p:txBody>
+          </p:sp>
+        </p:grpSp>
+      </p:grpSp>
+      <p:pic>
+        <p:nvPicPr>
+          <p:cNvPr id="13" name="Picture 12">
+            <a:extLst>
+              <a:ext uri="{FF2B5EF4-FFF2-40B4-BE49-F238E27FC236}">
+                <a16:creationId xmlns:a16="http://schemas.microsoft.com/office/drawing/2014/main" id="{B05D1209-3517-7EF2-73E1-25B204B19648}"/>
+              </a:ext>
+            </a:extLst>
+          </p:cNvPr>
+          <p:cNvPicPr>
+            <a:picLocks noChangeAspect="1"/>
+          </p:cNvPicPr>
+          <p:nvPr/>
+        </p:nvPicPr>
+        <p:blipFill>
+          <a:blip r:embed="rId2">
+            <a:extLst>
+              <a:ext uri="{28A0092B-C50C-407E-A947-70E740481C1C}">
+                <a14:useLocalDpi xmlns:a14="http://schemas.microsoft.com/office/drawing/2010/main" val="0"/>
+              </a:ext>
+            </a:extLst>
+          </a:blip>
+          <a:stretch>
+            <a:fillRect/>
+          </a:stretch>
+        </p:blipFill>
+        <p:spPr>
+          <a:xfrm>
+            <a:off x="1704700" y="1325134"/>
+            <a:ext cx="8135485" cy="4696480"/>
+          </a:xfrm>
+          <a:prstGeom prst="rect">
+            <a:avLst/>
+          </a:prstGeom>
+        </p:spPr>
+      </p:pic>
+      <p:sp>
+        <p:nvSpPr>
+          <p:cNvPr id="14" name="TextBox 13">
+            <a:extLst>
+              <a:ext uri="{FF2B5EF4-FFF2-40B4-BE49-F238E27FC236}">
+                <a16:creationId xmlns:a16="http://schemas.microsoft.com/office/drawing/2014/main" id="{45A6643F-C6FF-9EAC-3939-D992D8C1421B}"/>
+              </a:ext>
+            </a:extLst>
+          </p:cNvPr>
+          <p:cNvSpPr txBox="1"/>
+          <p:nvPr/>
+        </p:nvSpPr>
+        <p:spPr>
+          <a:xfrm>
+            <a:off x="261219" y="529729"/>
+            <a:ext cx="2819024" cy="646331"/>
+          </a:xfrm>
+          <a:prstGeom prst="rect">
+            <a:avLst/>
+          </a:prstGeom>
+          <a:solidFill>
+            <a:schemeClr val="accent5">
+              <a:lumMod val="20000"/>
+              <a:lumOff val="80000"/>
+            </a:schemeClr>
+          </a:solidFill>
+        </p:spPr>
+        <p:txBody>
+          <a:bodyPr wrap="square" rtlCol="1">
+            <a:spAutoFit/>
+          </a:bodyPr>
+          <a:lstStyle/>
+          <a:p>
+            <a:r>
+              <a:rPr lang="en-US" dirty="0">
+                <a:ln w="0"/>
+                <a:solidFill>
+                  <a:schemeClr val="accent1"/>
+                </a:solidFill>
+                <a:effectLst>
+                  <a:outerShdw blurRad="38100" dist="25400" dir="5400000" algn="ctr" rotWithShape="0">
+                    <a:srgbClr val="6E747A">
+                      <a:alpha val="43000"/>
+                    </a:srgbClr>
+                  </a:outerShdw>
+                </a:effectLst>
+              </a:rPr>
+              <a:t>Student : Pay service Sequence Diagram </a:t>
+            </a:r>
+            <a:endParaRPr lang="ar-EG" dirty="0">
+              <a:ln w="0"/>
+              <a:solidFill>
+                <a:schemeClr val="accent1"/>
+              </a:solidFill>
+              <a:effectLst>
+                <a:outerShdw blurRad="38100" dist="25400" dir="5400000" algn="ctr" rotWithShape="0">
+                  <a:srgbClr val="6E747A">
+                    <a:alpha val="43000"/>
+                  </a:srgbClr>
+                </a:outerShdw>
+              </a:effectLst>
+            </a:endParaRPr>
+          </a:p>
+        </p:txBody>
+      </p:sp>
+    </p:spTree>
+    <p:extLst>
+      <p:ext uri="{BB962C8B-B14F-4D97-AF65-F5344CB8AC3E}">
+        <p14:creationId xmlns:p14="http://schemas.microsoft.com/office/powerpoint/2010/main" val="3774595702"/>
+      </p:ext>
+    </p:extLst>
+  </p:cSld>
+  <p:clrMapOvr>
+    <a:masterClrMapping/>
+  </p:clrMapOvr>
+  <mc:AlternateContent xmlns:mc="http://schemas.openxmlformats.org/markup-compatibility/2006" xmlns:p14="http://schemas.microsoft.com/office/powerpoint/2010/main">
+    <mc:Choice Requires="p14">
+      <p:transition spd="slow" p14:dur="1500">
+        <p:random/>
+      </p:transition>
+    </mc:Choice>
+    <mc:Fallback xmlns="">
+      <p:transition spd="slow">
+        <p:random/>
+      </p:transition>
+    </mc:Fallback>
+  </mc:AlternateContent>
+  <p:timing>
+    <p:tnLst>
+      <p:par>
+        <p:cTn id="1" dur="indefinite" restart="never" nodeType="tmRoot">
+          <p:childTnLst>
+            <p:seq concurrent="1" nextAc="seek">
+              <p:cTn id="2" dur="indefinite" nodeType="mainSeq">
+                <p:childTnLst>
+                  <p:par>
+                    <p:cTn id="3" fill="hold">
+                      <p:stCondLst>
+                        <p:cond delay="indefinite"/>
+                        <p:cond evt="onBegin" delay="0">
+                          <p:tn val="2"/>
+                        </p:cond>
+                      </p:stCondLst>
+                      <p:childTnLst>
+                        <p:par>
+                          <p:cTn id="4" fill="hold">
+                            <p:stCondLst>
+                              <p:cond delay="0"/>
+                            </p:stCondLst>
+                            <p:childTnLst>
+                              <p:par>
+                                <p:cTn id="5" presetID="22" presetClass="entr" presetSubtype="8" fill="hold" nodeType="afterEffect">
+                                  <p:stCondLst>
+                                    <p:cond delay="0"/>
+                                  </p:stCondLst>
+                                  <p:childTnLst>
+                                    <p:set>
+                                      <p:cBhvr>
+                                        <p:cTn id="6" dur="1" fill="hold">
+                                          <p:stCondLst>
+                                            <p:cond delay="0"/>
+                                          </p:stCondLst>
+                                        </p:cTn>
+                                        <p:tgtEl>
+                                          <p:spTgt spid="7"/>
+                                        </p:tgtEl>
+                                        <p:attrNameLst>
+                                          <p:attrName>style.visibility</p:attrName>
+                                        </p:attrNameLst>
+                                      </p:cBhvr>
+                                      <p:to>
+                                        <p:strVal val="visible"/>
+                                      </p:to>
+                                    </p:set>
+                                    <p:animEffect transition="in" filter="wipe(left)">
+                                      <p:cBhvr>
+                                        <p:cTn id="7" dur="500"/>
+                                        <p:tgtEl>
+                                          <p:spTgt spid="7"/>
+                                        </p:tgtEl>
+                                      </p:cBhvr>
+                                    </p:animEffect>
+                                  </p:childTnLst>
+                                </p:cTn>
+                              </p:par>
+                              <p:par>
+                                <p:cTn id="8" presetID="10" presetClass="entr" presetSubtype="0" fill="hold" grpId="0" nodeType="withEffect">
+                                  <p:stCondLst>
+                                    <p:cond delay="0"/>
+                                  </p:stCondLst>
+                                  <p:childTnLst>
+                                    <p:set>
+                                      <p:cBhvr>
+                                        <p:cTn id="9" dur="1" fill="hold">
+                                          <p:stCondLst>
+                                            <p:cond delay="0"/>
+                                          </p:stCondLst>
+                                        </p:cTn>
+                                        <p:tgtEl>
+                                          <p:spTgt spid="14"/>
+                                        </p:tgtEl>
+                                        <p:attrNameLst>
+                                          <p:attrName>style.visibility</p:attrName>
+                                        </p:attrNameLst>
+                                      </p:cBhvr>
+                                      <p:to>
+                                        <p:strVal val="visible"/>
+                                      </p:to>
+                                    </p:set>
+                                    <p:animEffect transition="in" filter="fade">
+                                      <p:cBhvr>
+                                        <p:cTn id="10" dur="500"/>
+                                        <p:tgtEl>
+                                          <p:spTgt spid="14"/>
+                                        </p:tgtEl>
+                                      </p:cBhvr>
+                                    </p:animEffect>
+                                  </p:childTnLst>
+                                </p:cTn>
+                              </p:par>
+                            </p:childTnLst>
+                          </p:cTn>
+                        </p:par>
+                      </p:childTnLst>
+                    </p:cTn>
+                  </p:par>
+                </p:childTnLst>
+              </p:cTn>
+              <p:prevCondLst>
+                <p:cond evt="onPrev" delay="0">
+                  <p:tgtEl>
+                    <p:sldTgt/>
+                  </p:tgtEl>
+                </p:cond>
+              </p:prevCondLst>
+              <p:nextCondLst>
+                <p:cond evt="onNext" delay="0">
+                  <p:tgtEl>
+                    <p:sldTgt/>
+                  </p:tgtEl>
+                </p:cond>
+              </p:nextCondLst>
+            </p:seq>
+          </p:childTnLst>
+        </p:cTn>
+      </p:par>
+    </p:tnLst>
+    <p:bldLst>
+      <p:bldP spid="14" grpId="0" animBg="1"/>
+    </p:bldLst>
+  </p:timing>
+</p:sld>
+</file>
+
+<file path=ppt/slides/slide21.xml><?xml version="1.0" encoding="utf-8"?>
+<p:sld xmlns:a="http://schemas.openxmlformats.org/drawingml/2006/main" xmlns:r="http://schemas.openxmlformats.org/officeDocument/2006/relationships" xmlns:p="http://schemas.openxmlformats.org/presentationml/2006/main">
+  <p:cSld>
+    <p:spTree>
+      <p:nvGrpSpPr>
+        <p:cNvPr id="1" name=""/>
+        <p:cNvGrpSpPr/>
+        <p:nvPr/>
+      </p:nvGrpSpPr>
+      <p:grpSpPr>
+        <a:xfrm>
+          <a:off x="0" y="0"/>
+          <a:ext cx="0" cy="0"/>
+          <a:chOff x="0" y="0"/>
+          <a:chExt cx="0" cy="0"/>
+        </a:xfrm>
+      </p:grpSpPr>
+      <p:grpSp>
+        <p:nvGrpSpPr>
+          <p:cNvPr id="2" name="组合 1">
+            <a:extLst>
+              <a:ext uri="{FF2B5EF4-FFF2-40B4-BE49-F238E27FC236}">
+                <a16:creationId xmlns:a16="http://schemas.microsoft.com/office/drawing/2014/main" id="{04E79910-8643-7462-D27E-389ADC0CAB9D}"/>
+              </a:ext>
+            </a:extLst>
+          </p:cNvPr>
+          <p:cNvGrpSpPr/>
+          <p:nvPr/>
+        </p:nvGrpSpPr>
+        <p:grpSpPr>
+          <a:xfrm>
+            <a:off x="3844721" y="472626"/>
+            <a:ext cx="5538430" cy="380269"/>
+            <a:chOff x="567034" y="536946"/>
+            <a:chExt cx="5538430" cy="380269"/>
+          </a:xfrm>
+        </p:grpSpPr>
+        <p:sp>
+          <p:nvSpPr>
+            <p:cNvPr id="3" name="文本框 2">
+              <a:extLst>
+                <a:ext uri="{FF2B5EF4-FFF2-40B4-BE49-F238E27FC236}">
+                  <a16:creationId xmlns:a16="http://schemas.microsoft.com/office/drawing/2014/main" id="{C4683984-58A5-110E-FEC8-A757F69AEEBA}"/>
+                </a:ext>
+              </a:extLst>
+            </p:cNvPr>
+            <p:cNvSpPr txBox="1"/>
+            <p:nvPr/>
+          </p:nvSpPr>
+          <p:spPr>
+            <a:xfrm>
+              <a:off x="585790" y="536946"/>
+              <a:ext cx="5519674" cy="369332"/>
+            </a:xfrm>
+            <a:prstGeom prst="rect">
+              <a:avLst/>
+            </a:prstGeom>
+            <a:noFill/>
+          </p:spPr>
+          <p:txBody>
+            <a:bodyPr wrap="square" rtlCol="0">
+              <a:spAutoFit/>
+            </a:bodyPr>
+            <a:lstStyle/>
+            <a:p>
+              <a:pPr algn="ctr"/>
+              <a:r>
+                <a:rPr lang="en-US" altLang="zh-CN" sz="1800" dirty="0">
+                  <a:latin typeface="Yeseva One" panose="00000500000000000000" pitchFamily="2" charset="0"/>
+                  <a:ea typeface="字魂5号-无外润黑体" panose="00000500000000000000" pitchFamily="2" charset="-122"/>
+                </a:rPr>
+                <a:t>System Analysis and design : sequence Diagram-3</a:t>
+              </a:r>
+            </a:p>
+          </p:txBody>
+        </p:sp>
+        <p:grpSp>
+          <p:nvGrpSpPr>
+            <p:cNvPr id="4" name="组合 3">
+              <a:extLst>
+                <a:ext uri="{FF2B5EF4-FFF2-40B4-BE49-F238E27FC236}">
+                  <a16:creationId xmlns:a16="http://schemas.microsoft.com/office/drawing/2014/main" id="{509EE1CC-5FB2-4E7F-4E0D-8D2116D1131D}"/>
+                </a:ext>
+              </a:extLst>
+            </p:cNvPr>
+            <p:cNvGrpSpPr/>
+            <p:nvPr/>
+          </p:nvGrpSpPr>
+          <p:grpSpPr>
+            <a:xfrm>
+              <a:off x="567034" y="554816"/>
+              <a:ext cx="3945816" cy="362399"/>
+              <a:chOff x="567034" y="554816"/>
+              <a:chExt cx="3945816" cy="362399"/>
+            </a:xfrm>
+          </p:grpSpPr>
+          <p:cxnSp>
+            <p:nvCxnSpPr>
+              <p:cNvPr id="5" name="直接连接符 4">
+                <a:extLst>
+                  <a:ext uri="{FF2B5EF4-FFF2-40B4-BE49-F238E27FC236}">
+                    <a16:creationId xmlns:a16="http://schemas.microsoft.com/office/drawing/2014/main" id="{39501EDE-E522-6246-8EBF-5AFE328AA534}"/>
+                  </a:ext>
+                </a:extLst>
+              </p:cNvPr>
+              <p:cNvCxnSpPr>
+                <a:cxnSpLocks/>
+              </p:cNvCxnSpPr>
+              <p:nvPr/>
+            </p:nvCxnSpPr>
+            <p:spPr>
+              <a:xfrm>
+                <a:off x="798051" y="900706"/>
+                <a:ext cx="3714799" cy="0"/>
+              </a:xfrm>
+              <a:prstGeom prst="line">
+                <a:avLst/>
+              </a:prstGeom>
+              <a:ln w="15875">
+                <a:solidFill>
+                  <a:srgbClr val="1671C2"/>
+                </a:solidFill>
+              </a:ln>
+            </p:spPr>
+            <p:style>
+              <a:lnRef idx="1">
+                <a:schemeClr val="accent1"/>
+              </a:lnRef>
+              <a:fillRef idx="0">
+                <a:schemeClr val="accent1"/>
+              </a:fillRef>
+              <a:effectRef idx="0">
+                <a:schemeClr val="accent1"/>
+              </a:effectRef>
+              <a:fontRef idx="minor">
+                <a:schemeClr val="tx1"/>
+              </a:fontRef>
+            </p:style>
+          </p:cxnSp>
+          <p:sp>
+            <p:nvSpPr>
+              <p:cNvPr id="6" name="矩形: 圆角 5">
+                <a:extLst>
+                  <a:ext uri="{FF2B5EF4-FFF2-40B4-BE49-F238E27FC236}">
+                    <a16:creationId xmlns:a16="http://schemas.microsoft.com/office/drawing/2014/main" id="{EBD478AF-0D3D-F64B-C1E9-CA3F7C41FC4F}"/>
+                  </a:ext>
+                </a:extLst>
+              </p:cNvPr>
+              <p:cNvSpPr/>
+              <p:nvPr/>
+            </p:nvSpPr>
+            <p:spPr>
+              <a:xfrm>
+                <a:off x="567034" y="554816"/>
+                <a:ext cx="362314" cy="362399"/>
+              </a:xfrm>
+              <a:prstGeom prst="roundRect">
+                <a:avLst/>
+              </a:prstGeom>
+              <a:solidFill>
+                <a:srgbClr val="1671C2"/>
+              </a:solidFill>
+              <a:ln>
+                <a:noFill/>
+              </a:ln>
+            </p:spPr>
+            <p:style>
+              <a:lnRef idx="2">
+                <a:schemeClr val="accent1">
+                  <a:shade val="50000"/>
+                </a:schemeClr>
+              </a:lnRef>
+              <a:fillRef idx="1">
+                <a:schemeClr val="accent1"/>
+              </a:fillRef>
+              <a:effectRef idx="0">
+                <a:schemeClr val="accent1"/>
+              </a:effectRef>
+              <a:fontRef idx="minor">
+                <a:schemeClr val="lt1"/>
+              </a:fontRef>
+            </p:style>
+            <p:txBody>
+              <a:bodyPr rtlCol="0" anchor="ctr"/>
+              <a:lstStyle/>
+              <a:p>
+                <a:pPr algn="ctr"/>
+                <a:r>
+                  <a:rPr lang="en-US" altLang="zh-CN" dirty="0">
+                    <a:solidFill>
+                      <a:schemeClr val="bg1"/>
+                    </a:solidFill>
+                    <a:latin typeface="Yeseva One" panose="00000500000000000000" pitchFamily="2" charset="0"/>
+                    <a:ea typeface="字魂5号-无外润黑体" panose="00000500000000000000" pitchFamily="2" charset="-122"/>
+                  </a:rPr>
+                  <a:t>4</a:t>
+                </a:r>
+                <a:endParaRPr lang="zh-CN" altLang="en-US" dirty="0">
+                  <a:solidFill>
+                    <a:schemeClr val="bg1"/>
+                  </a:solidFill>
+                  <a:latin typeface="Yeseva One" panose="00000500000000000000" pitchFamily="2" charset="0"/>
+                  <a:ea typeface="字魂5号-无外润黑体" panose="00000500000000000000" pitchFamily="2" charset="-122"/>
+                </a:endParaRPr>
+              </a:p>
+            </p:txBody>
+          </p:sp>
+        </p:grpSp>
+      </p:grpSp>
+      <p:pic>
+        <p:nvPicPr>
+          <p:cNvPr id="8" name="Picture 7">
+            <a:extLst>
+              <a:ext uri="{FF2B5EF4-FFF2-40B4-BE49-F238E27FC236}">
+                <a16:creationId xmlns:a16="http://schemas.microsoft.com/office/drawing/2014/main" id="{DAD8DF70-9BE1-B2BE-6CEF-78ED1144F40D}"/>
+              </a:ext>
+            </a:extLst>
+          </p:cNvPr>
+          <p:cNvPicPr>
+            <a:picLocks noChangeAspect="1"/>
+          </p:cNvPicPr>
+          <p:nvPr/>
+        </p:nvPicPr>
+        <p:blipFill rotWithShape="1">
+          <a:blip r:embed="rId2">
+            <a:extLst>
+              <a:ext uri="{28A0092B-C50C-407E-A947-70E740481C1C}">
+                <a14:useLocalDpi xmlns:a14="http://schemas.microsoft.com/office/drawing/2010/main" val="0"/>
+              </a:ext>
+            </a:extLst>
+          </a:blip>
+          <a:srcRect l="10918" r="13896"/>
+          <a:stretch/>
+        </p:blipFill>
+        <p:spPr>
+          <a:xfrm>
+            <a:off x="-1" y="970671"/>
+            <a:ext cx="5608739" cy="5374877"/>
+          </a:xfrm>
+          <a:prstGeom prst="rect">
+            <a:avLst/>
+          </a:prstGeom>
+        </p:spPr>
+      </p:pic>
+      <p:pic>
+        <p:nvPicPr>
+          <p:cNvPr id="10" name="Picture 9">
+            <a:extLst>
+              <a:ext uri="{FF2B5EF4-FFF2-40B4-BE49-F238E27FC236}">
+                <a16:creationId xmlns:a16="http://schemas.microsoft.com/office/drawing/2014/main" id="{F3695771-239D-42D2-8CEA-591F3C1A65BB}"/>
+              </a:ext>
+            </a:extLst>
+          </p:cNvPr>
+          <p:cNvPicPr>
+            <a:picLocks noChangeAspect="1"/>
+          </p:cNvPicPr>
+          <p:nvPr/>
+        </p:nvPicPr>
+        <p:blipFill rotWithShape="1">
+          <a:blip r:embed="rId3">
+            <a:extLst>
+              <a:ext uri="{28A0092B-C50C-407E-A947-70E740481C1C}">
+                <a14:useLocalDpi xmlns:a14="http://schemas.microsoft.com/office/drawing/2010/main" val="0"/>
+              </a:ext>
+            </a:extLst>
+          </a:blip>
+          <a:srcRect l="12619"/>
+          <a:stretch/>
+        </p:blipFill>
+        <p:spPr>
+          <a:xfrm>
+            <a:off x="5781822" y="1200147"/>
+            <a:ext cx="6221112" cy="5145401"/>
+          </a:xfrm>
+          <a:prstGeom prst="rect">
+            <a:avLst/>
+          </a:prstGeom>
+        </p:spPr>
+      </p:pic>
+      <p:sp>
+        <p:nvSpPr>
+          <p:cNvPr id="11" name="TextBox 10">
+            <a:extLst>
+              <a:ext uri="{FF2B5EF4-FFF2-40B4-BE49-F238E27FC236}">
+                <a16:creationId xmlns:a16="http://schemas.microsoft.com/office/drawing/2014/main" id="{F2A328CE-7D32-3E27-5777-FF8EE527F8DB}"/>
+              </a:ext>
+            </a:extLst>
+          </p:cNvPr>
+          <p:cNvSpPr txBox="1"/>
+          <p:nvPr/>
+        </p:nvSpPr>
+        <p:spPr>
+          <a:xfrm>
+            <a:off x="261219" y="490496"/>
+            <a:ext cx="2819024" cy="646331"/>
+          </a:xfrm>
+          <a:prstGeom prst="rect">
+            <a:avLst/>
+          </a:prstGeom>
+          <a:solidFill>
+            <a:schemeClr val="accent5">
+              <a:lumMod val="20000"/>
+              <a:lumOff val="80000"/>
+            </a:schemeClr>
+          </a:solidFill>
+        </p:spPr>
+        <p:txBody>
+          <a:bodyPr wrap="square" rtlCol="1">
+            <a:spAutoFit/>
+          </a:bodyPr>
+          <a:lstStyle/>
+          <a:p>
+            <a:pPr algn="ctr"/>
+            <a:r>
+              <a:rPr lang="en-US" dirty="0">
+                <a:ln w="0"/>
+                <a:solidFill>
+                  <a:schemeClr val="accent1"/>
+                </a:solidFill>
+                <a:effectLst>
+                  <a:outerShdw blurRad="38100" dist="25400" dir="5400000" algn="ctr" rotWithShape="0">
+                    <a:srgbClr val="6E747A">
+                      <a:alpha val="43000"/>
+                    </a:srgbClr>
+                  </a:outerShdw>
+                </a:effectLst>
+              </a:rPr>
+              <a:t>Users : login Sequence Diagram </a:t>
+            </a:r>
+            <a:endParaRPr lang="ar-EG" dirty="0">
+              <a:ln w="0"/>
+              <a:solidFill>
+                <a:schemeClr val="accent1"/>
+              </a:solidFill>
+              <a:effectLst>
+                <a:outerShdw blurRad="38100" dist="25400" dir="5400000" algn="ctr" rotWithShape="0">
+                  <a:srgbClr val="6E747A">
+                    <a:alpha val="43000"/>
+                  </a:srgbClr>
+                </a:outerShdw>
+              </a:effectLst>
+            </a:endParaRPr>
+          </a:p>
+        </p:txBody>
+      </p:sp>
+    </p:spTree>
+    <p:extLst>
+      <p:ext uri="{BB962C8B-B14F-4D97-AF65-F5344CB8AC3E}">
+        <p14:creationId xmlns:p14="http://schemas.microsoft.com/office/powerpoint/2010/main" val="3400844132"/>
+      </p:ext>
+    </p:extLst>
+  </p:cSld>
+  <p:clrMapOvr>
+    <a:masterClrMapping/>
+  </p:clrMapOvr>
+  <mc:AlternateContent xmlns:mc="http://schemas.openxmlformats.org/markup-compatibility/2006" xmlns:p14="http://schemas.microsoft.com/office/powerpoint/2010/main">
+    <mc:Choice Requires="p14">
+      <p:transition spd="slow" p14:dur="1500">
+        <p:random/>
+      </p:transition>
+    </mc:Choice>
+    <mc:Fallback xmlns="">
+      <p:transition spd="slow">
+        <p:random/>
+      </p:transition>
+    </mc:Fallback>
+  </mc:AlternateContent>
+  <p:timing>
+    <p:tnLst>
+      <p:par>
+        <p:cTn id="1" dur="indefinite" restart="never" nodeType="tmRoot">
+          <p:childTnLst>
+            <p:seq concurrent="1" nextAc="seek">
+              <p:cTn id="2" dur="indefinite" nodeType="mainSeq">
+                <p:childTnLst>
+                  <p:par>
+                    <p:cTn id="3" fill="hold">
+                      <p:stCondLst>
+                        <p:cond delay="indefinite"/>
+                        <p:cond evt="onBegin" delay="0">
+                          <p:tn val="2"/>
+                        </p:cond>
+                      </p:stCondLst>
+                      <p:childTnLst>
+                        <p:par>
+                          <p:cTn id="4" fill="hold">
+                            <p:stCondLst>
+                              <p:cond delay="0"/>
+                            </p:stCondLst>
+                            <p:childTnLst>
+                              <p:par>
+                                <p:cTn id="5" presetID="22" presetClass="entr" presetSubtype="8" fill="hold" nodeType="afterEffect">
+                                  <p:stCondLst>
+                                    <p:cond delay="0"/>
+                                  </p:stCondLst>
+                                  <p:childTnLst>
+                                    <p:set>
+                                      <p:cBhvr>
+                                        <p:cTn id="6" dur="1" fill="hold">
+                                          <p:stCondLst>
+                                            <p:cond delay="0"/>
+                                          </p:stCondLst>
+                                        </p:cTn>
+                                        <p:tgtEl>
+                                          <p:spTgt spid="2"/>
+                                        </p:tgtEl>
+                                        <p:attrNameLst>
+                                          <p:attrName>style.visibility</p:attrName>
+                                        </p:attrNameLst>
+                                      </p:cBhvr>
+                                      <p:to>
+                                        <p:strVal val="visible"/>
+                                      </p:to>
+                                    </p:set>
+                                    <p:animEffect transition="in" filter="wipe(left)">
+                                      <p:cBhvr>
+                                        <p:cTn id="7" dur="500"/>
+                                        <p:tgtEl>
+                                          <p:spTgt spid="2"/>
+                                        </p:tgtEl>
+                                      </p:cBhvr>
+                                    </p:animEffect>
+                                  </p:childTnLst>
+                                </p:cTn>
+                              </p:par>
+                              <p:par>
+                                <p:cTn id="8" presetID="10" presetClass="entr" presetSubtype="0" fill="hold" grpId="0" nodeType="withEffect">
+                                  <p:stCondLst>
+                                    <p:cond delay="0"/>
+                                  </p:stCondLst>
+                                  <p:childTnLst>
+                                    <p:set>
+                                      <p:cBhvr>
+                                        <p:cTn id="9" dur="1" fill="hold">
+                                          <p:stCondLst>
+                                            <p:cond delay="0"/>
+                                          </p:stCondLst>
+                                        </p:cTn>
+                                        <p:tgtEl>
+                                          <p:spTgt spid="11"/>
+                                        </p:tgtEl>
+                                        <p:attrNameLst>
+                                          <p:attrName>style.visibility</p:attrName>
+                                        </p:attrNameLst>
+                                      </p:cBhvr>
+                                      <p:to>
+                                        <p:strVal val="visible"/>
+                                      </p:to>
+                                    </p:set>
+                                    <p:animEffect transition="in" filter="fade">
+                                      <p:cBhvr>
+                                        <p:cTn id="10" dur="500"/>
+                                        <p:tgtEl>
+                                          <p:spTgt spid="11"/>
+                                        </p:tgtEl>
+                                      </p:cBhvr>
+                                    </p:animEffect>
+                                  </p:childTnLst>
+                                </p:cTn>
+                              </p:par>
+                            </p:childTnLst>
+                          </p:cTn>
+                        </p:par>
+                      </p:childTnLst>
+                    </p:cTn>
+                  </p:par>
+                </p:childTnLst>
+              </p:cTn>
+              <p:prevCondLst>
+                <p:cond evt="onPrev" delay="0">
+                  <p:tgtEl>
+                    <p:sldTgt/>
+                  </p:tgtEl>
+                </p:cond>
+              </p:prevCondLst>
+              <p:nextCondLst>
+                <p:cond evt="onNext" delay="0">
+                  <p:tgtEl>
+                    <p:sldTgt/>
+                  </p:tgtEl>
+                </p:cond>
+              </p:nextCondLst>
+            </p:seq>
+          </p:childTnLst>
+        </p:cTn>
+      </p:par>
+    </p:tnLst>
+    <p:bldLst>
+      <p:bldP spid="11" grpId="0" animBg="1"/>
+    </p:bldLst>
+  </p:timing>
+</p:sld>
+</file>
+
+<file path=ppt/slides/slide22.xml><?xml version="1.0" encoding="utf-8"?>
+<p:sld xmlns:a="http://schemas.openxmlformats.org/drawingml/2006/main" xmlns:r="http://schemas.openxmlformats.org/officeDocument/2006/relationships" xmlns:p="http://schemas.openxmlformats.org/presentationml/2006/main">
+  <p:cSld>
+    <p:spTree>
+      <p:nvGrpSpPr>
+        <p:cNvPr id="1" name=""/>
+        <p:cNvGrpSpPr/>
+        <p:nvPr/>
+      </p:nvGrpSpPr>
+      <p:grpSpPr>
+        <a:xfrm>
+          <a:off x="0" y="0"/>
+          <a:ext cx="0" cy="0"/>
+          <a:chOff x="0" y="0"/>
+          <a:chExt cx="0" cy="0"/>
+        </a:xfrm>
+      </p:grpSpPr>
+      <p:grpSp>
+        <p:nvGrpSpPr>
+          <p:cNvPr id="2" name="组合 1">
+            <a:extLst>
+              <a:ext uri="{FF2B5EF4-FFF2-40B4-BE49-F238E27FC236}">
+                <a16:creationId xmlns:a16="http://schemas.microsoft.com/office/drawing/2014/main" id="{9E1CC22B-EC6A-4899-D6E1-10F9DE2ACA56}"/>
+              </a:ext>
+            </a:extLst>
+          </p:cNvPr>
+          <p:cNvGrpSpPr/>
+          <p:nvPr/>
+        </p:nvGrpSpPr>
+        <p:grpSpPr>
+          <a:xfrm>
+            <a:off x="0" y="377294"/>
+            <a:ext cx="5213167" cy="392623"/>
+            <a:chOff x="455162" y="524592"/>
+            <a:chExt cx="5213167" cy="392623"/>
+          </a:xfrm>
+        </p:grpSpPr>
+        <p:sp>
+          <p:nvSpPr>
+            <p:cNvPr id="3" name="文本框 2">
+              <a:extLst>
+                <a:ext uri="{FF2B5EF4-FFF2-40B4-BE49-F238E27FC236}">
+                  <a16:creationId xmlns:a16="http://schemas.microsoft.com/office/drawing/2014/main" id="{FC6F568C-911E-6377-8EE4-3E553B1BE525}"/>
+                </a:ext>
+              </a:extLst>
+            </p:cNvPr>
+            <p:cNvSpPr txBox="1"/>
+            <p:nvPr/>
+          </p:nvSpPr>
+          <p:spPr>
+            <a:xfrm>
+              <a:off x="455162" y="524592"/>
+              <a:ext cx="5213167" cy="369332"/>
+            </a:xfrm>
+            <a:prstGeom prst="rect">
+              <a:avLst/>
+            </a:prstGeom>
+            <a:noFill/>
+          </p:spPr>
+          <p:txBody>
+            <a:bodyPr wrap="square" rtlCol="0">
+              <a:spAutoFit/>
+            </a:bodyPr>
+            <a:lstStyle/>
+            <a:p>
+              <a:pPr algn="ctr"/>
+              <a:r>
+                <a:rPr lang="en-US" altLang="zh-CN" sz="1800" dirty="0">
+                  <a:latin typeface="Yeseva One" panose="00000500000000000000" pitchFamily="2" charset="0"/>
+                  <a:ea typeface="字魂5号-无外润黑体" panose="00000500000000000000" pitchFamily="2" charset="-122"/>
+                </a:rPr>
+                <a:t>System Analysis and design : Class Diagram</a:t>
+              </a:r>
+            </a:p>
+          </p:txBody>
+        </p:sp>
+        <p:grpSp>
+          <p:nvGrpSpPr>
+            <p:cNvPr id="4" name="组合 3">
+              <a:extLst>
+                <a:ext uri="{FF2B5EF4-FFF2-40B4-BE49-F238E27FC236}">
+                  <a16:creationId xmlns:a16="http://schemas.microsoft.com/office/drawing/2014/main" id="{06CFFE25-C379-D67F-48F0-3E8E2163C546}"/>
+                </a:ext>
+              </a:extLst>
+            </p:cNvPr>
+            <p:cNvGrpSpPr/>
+            <p:nvPr/>
+          </p:nvGrpSpPr>
+          <p:grpSpPr>
+            <a:xfrm>
+              <a:off x="567034" y="554816"/>
+              <a:ext cx="3945816" cy="362399"/>
+              <a:chOff x="567034" y="554816"/>
+              <a:chExt cx="3945816" cy="362399"/>
+            </a:xfrm>
+          </p:grpSpPr>
+          <p:cxnSp>
+            <p:nvCxnSpPr>
+              <p:cNvPr id="5" name="直接连接符 4">
+                <a:extLst>
+                  <a:ext uri="{FF2B5EF4-FFF2-40B4-BE49-F238E27FC236}">
+                    <a16:creationId xmlns:a16="http://schemas.microsoft.com/office/drawing/2014/main" id="{31DC2C05-3814-F618-5485-A4CE6F3F9116}"/>
+                  </a:ext>
+                </a:extLst>
+              </p:cNvPr>
+              <p:cNvCxnSpPr>
+                <a:cxnSpLocks/>
+              </p:cNvCxnSpPr>
+              <p:nvPr/>
+            </p:nvCxnSpPr>
+            <p:spPr>
+              <a:xfrm>
+                <a:off x="798051" y="900706"/>
+                <a:ext cx="3714799" cy="0"/>
+              </a:xfrm>
+              <a:prstGeom prst="line">
+                <a:avLst/>
+              </a:prstGeom>
+              <a:ln w="15875">
+                <a:solidFill>
+                  <a:srgbClr val="1671C2"/>
+                </a:solidFill>
+              </a:ln>
+            </p:spPr>
+            <p:style>
+              <a:lnRef idx="1">
+                <a:schemeClr val="accent1"/>
+              </a:lnRef>
+              <a:fillRef idx="0">
+                <a:schemeClr val="accent1"/>
+              </a:fillRef>
+              <a:effectRef idx="0">
+                <a:schemeClr val="accent1"/>
+              </a:effectRef>
+              <a:fontRef idx="minor">
+                <a:schemeClr val="tx1"/>
+              </a:fontRef>
+            </p:style>
+          </p:cxnSp>
+          <p:sp>
+            <p:nvSpPr>
+              <p:cNvPr id="6" name="矩形: 圆角 5">
+                <a:extLst>
+                  <a:ext uri="{FF2B5EF4-FFF2-40B4-BE49-F238E27FC236}">
+                    <a16:creationId xmlns:a16="http://schemas.microsoft.com/office/drawing/2014/main" id="{39A3C9FA-9095-5A66-78A4-EAF88CC5E6A5}"/>
+                  </a:ext>
+                </a:extLst>
+              </p:cNvPr>
+              <p:cNvSpPr/>
+              <p:nvPr/>
+            </p:nvSpPr>
+            <p:spPr>
+              <a:xfrm>
+                <a:off x="567034" y="554816"/>
+                <a:ext cx="362314" cy="362399"/>
+              </a:xfrm>
+              <a:prstGeom prst="roundRect">
+                <a:avLst/>
+              </a:prstGeom>
+              <a:solidFill>
+                <a:srgbClr val="1671C2"/>
+              </a:solidFill>
+              <a:ln>
+                <a:noFill/>
+              </a:ln>
+            </p:spPr>
+            <p:style>
+              <a:lnRef idx="2">
+                <a:schemeClr val="accent1">
+                  <a:shade val="50000"/>
+                </a:schemeClr>
+              </a:lnRef>
+              <a:fillRef idx="1">
+                <a:schemeClr val="accent1"/>
+              </a:fillRef>
+              <a:effectRef idx="0">
+                <a:schemeClr val="accent1"/>
+              </a:effectRef>
+              <a:fontRef idx="minor">
+                <a:schemeClr val="lt1"/>
+              </a:fontRef>
+            </p:style>
+            <p:txBody>
+              <a:bodyPr rtlCol="0" anchor="ctr"/>
+              <a:lstStyle/>
+              <a:p>
+                <a:pPr algn="ctr"/>
+                <a:r>
+                  <a:rPr lang="en-US" altLang="zh-CN" dirty="0">
+                    <a:solidFill>
+                      <a:schemeClr val="bg1"/>
+                    </a:solidFill>
+                    <a:latin typeface="Yeseva One" panose="00000500000000000000" pitchFamily="2" charset="0"/>
+                    <a:ea typeface="字魂5号-无外润黑体" panose="00000500000000000000" pitchFamily="2" charset="-122"/>
+                  </a:rPr>
+                  <a:t>4</a:t>
+                </a:r>
+                <a:endParaRPr lang="zh-CN" altLang="en-US" dirty="0">
+                  <a:solidFill>
+                    <a:schemeClr val="bg1"/>
+                  </a:solidFill>
+                  <a:latin typeface="Yeseva One" panose="00000500000000000000" pitchFamily="2" charset="0"/>
+                  <a:ea typeface="字魂5号-无外润黑体" panose="00000500000000000000" pitchFamily="2" charset="-122"/>
+                </a:endParaRPr>
+              </a:p>
+            </p:txBody>
+          </p:sp>
+        </p:grpSp>
+      </p:grpSp>
+      <p:pic>
+        <p:nvPicPr>
+          <p:cNvPr id="11" name="Picture 10">
+            <a:extLst>
+              <a:ext uri="{FF2B5EF4-FFF2-40B4-BE49-F238E27FC236}">
+                <a16:creationId xmlns:a16="http://schemas.microsoft.com/office/drawing/2014/main" id="{5D649D99-50C8-6EFE-91BD-0A6865124945}"/>
+              </a:ext>
+            </a:extLst>
+          </p:cNvPr>
+          <p:cNvPicPr>
+            <a:picLocks noChangeAspect="1"/>
+          </p:cNvPicPr>
+          <p:nvPr/>
+        </p:nvPicPr>
+        <p:blipFill>
+          <a:blip r:embed="rId2">
+            <a:extLst>
+              <a:ext uri="{28A0092B-C50C-407E-A947-70E740481C1C}">
+                <a14:useLocalDpi xmlns:a14="http://schemas.microsoft.com/office/drawing/2010/main" val="0"/>
+              </a:ext>
+            </a:extLst>
+          </a:blip>
+          <a:stretch>
+            <a:fillRect/>
+          </a:stretch>
+        </p:blipFill>
+        <p:spPr>
+          <a:xfrm>
+            <a:off x="4853355" y="467783"/>
+            <a:ext cx="6084754" cy="5922434"/>
+          </a:xfrm>
+          <a:prstGeom prst="rect">
+            <a:avLst/>
+          </a:prstGeom>
+        </p:spPr>
+      </p:pic>
+    </p:spTree>
+    <p:extLst>
+      <p:ext uri="{BB962C8B-B14F-4D97-AF65-F5344CB8AC3E}">
+        <p14:creationId xmlns:p14="http://schemas.microsoft.com/office/powerpoint/2010/main" val="36411758"/>
+      </p:ext>
+    </p:extLst>
+  </p:cSld>
+  <p:clrMapOvr>
+    <a:masterClrMapping/>
+  </p:clrMapOvr>
+  <mc:AlternateContent xmlns:mc="http://schemas.openxmlformats.org/markup-compatibility/2006" xmlns:p14="http://schemas.microsoft.com/office/powerpoint/2010/main">
+    <mc:Choice Requires="p14">
+      <p:transition spd="slow" p14:dur="1500">
+        <p:random/>
+      </p:transition>
+    </mc:Choice>
+    <mc:Fallback xmlns="">
+      <p:transition spd="slow">
+        <p:random/>
+      </p:transition>
+    </mc:Fallback>
+  </mc:AlternateContent>
+  <p:timing>
+    <p:tnLst>
+      <p:par>
+        <p:cTn id="1" dur="indefinite" restart="never" nodeType="tmRoot">
+          <p:childTnLst>
+            <p:seq concurrent="1" nextAc="seek">
+              <p:cTn id="2" dur="indefinite" nodeType="mainSeq">
+                <p:childTnLst>
+                  <p:par>
+                    <p:cTn id="3" fill="hold">
+                      <p:stCondLst>
+                        <p:cond delay="indefinite"/>
+                        <p:cond evt="onBegin" delay="0">
+                          <p:tn val="2"/>
+                        </p:cond>
+                      </p:stCondLst>
+                      <p:childTnLst>
+                        <p:par>
+                          <p:cTn id="4" fill="hold">
+                            <p:stCondLst>
+                              <p:cond delay="0"/>
+                            </p:stCondLst>
+                            <p:childTnLst>
+                              <p:par>
+                                <p:cTn id="5" presetID="22" presetClass="entr" presetSubtype="8" fill="hold" nodeType="afterEffect">
+                                  <p:stCondLst>
+                                    <p:cond delay="0"/>
+                                  </p:stCondLst>
+                                  <p:childTnLst>
+                                    <p:set>
+                                      <p:cBhvr>
+                                        <p:cTn id="6" dur="1" fill="hold">
+                                          <p:stCondLst>
+                                            <p:cond delay="0"/>
+                                          </p:stCondLst>
+                                        </p:cTn>
+                                        <p:tgtEl>
+                                          <p:spTgt spid="2"/>
+                                        </p:tgtEl>
+                                        <p:attrNameLst>
+                                          <p:attrName>style.visibility</p:attrName>
+                                        </p:attrNameLst>
+                                      </p:cBhvr>
+                                      <p:to>
+                                        <p:strVal val="visible"/>
+                                      </p:to>
+                                    </p:set>
+                                    <p:animEffect transition="in" filter="wipe(left)">
+                                      <p:cBhvr>
+                                        <p:cTn id="7" dur="500"/>
+                                        <p:tgtEl>
+                                          <p:spTgt spid="2"/>
+                                        </p:tgtEl>
+                                      </p:cBhvr>
+                                    </p:animEffect>
+                                  </p:childTnLst>
+                                </p:cTn>
+                              </p:par>
+                              <p:par>
+                                <p:cTn id="8" presetID="16" presetClass="entr" presetSubtype="21" fill="hold" nodeType="withEffect">
+                                  <p:stCondLst>
+                                    <p:cond delay="0"/>
+                                  </p:stCondLst>
+                                  <p:childTnLst>
+                                    <p:set>
+                                      <p:cBhvr>
+                                        <p:cTn id="9" dur="1" fill="hold">
+                                          <p:stCondLst>
+                                            <p:cond delay="0"/>
+                                          </p:stCondLst>
+                                        </p:cTn>
+                                        <p:tgtEl>
+                                          <p:spTgt spid="11"/>
+                                        </p:tgtEl>
+                                        <p:attrNameLst>
+                                          <p:attrName>style.visibility</p:attrName>
+                                        </p:attrNameLst>
+                                      </p:cBhvr>
+                                      <p:to>
+                                        <p:strVal val="visible"/>
+                                      </p:to>
+                                    </p:set>
+                                    <p:animEffect transition="in" filter="barn(inVertical)">
+                                      <p:cBhvr>
+                                        <p:cTn id="10" dur="500"/>
+                                        <p:tgtEl>
+                                          <p:spTgt spid="11"/>
+                                        </p:tgtEl>
+                                      </p:cBhvr>
+                                    </p:animEffect>
+                                  </p:childTnLst>
+                                </p:cTn>
+                              </p:par>
+                            </p:childTnLst>
+                          </p:cTn>
+                        </p:par>
+                      </p:childTnLst>
+                    </p:cTn>
+                  </p:par>
+                </p:childTnLst>
+              </p:cTn>
+              <p:prevCondLst>
+                <p:cond evt="onPrev" delay="0">
+                  <p:tgtEl>
+                    <p:sldTgt/>
+                  </p:tgtEl>
+                </p:cond>
+              </p:prevCondLst>
+              <p:nextCondLst>
+                <p:cond evt="onNext" delay="0">
+                  <p:tgtEl>
+                    <p:sldTgt/>
+                  </p:tgtEl>
+                </p:cond>
+              </p:nextCondLst>
+            </p:seq>
+          </p:childTnLst>
+        </p:cTn>
+      </p:par>
+    </p:tnLst>
+  </p:timing>
+</p:sld>
+</file>
+
+<file path=ppt/slides/slide23.xml><?xml version="1.0" encoding="utf-8"?>
 <p:sld xmlns:a="http://schemas.openxmlformats.org/drawingml/2006/main" xmlns:r="http://schemas.openxmlformats.org/officeDocument/2006/relationships" xmlns:p="http://schemas.openxmlformats.org/presentationml/2006/main">
   <p:cSld>
     <p:spTree>
@@ -24325,7 +25770,7 @@
         </p:nvSpPr>
         <p:spPr>
           <a:xfrm>
-            <a:off x="3668215" y="1820348"/>
+            <a:off x="3668215" y="1805568"/>
             <a:ext cx="621046" cy="602080"/>
           </a:xfrm>
           <a:prstGeom prst="ellipse">
@@ -24383,7 +25828,7 @@
         </p:nvSpPr>
         <p:spPr>
           <a:xfrm>
-            <a:off x="3673395" y="2708197"/>
+            <a:off x="3715005" y="2581951"/>
             <a:ext cx="621046" cy="602080"/>
           </a:xfrm>
           <a:prstGeom prst="ellipse">
@@ -24441,7 +25886,7 @@
         </p:nvSpPr>
         <p:spPr>
           <a:xfrm>
-            <a:off x="3669746" y="3584823"/>
+            <a:off x="3697258" y="3358334"/>
             <a:ext cx="621046" cy="602080"/>
           </a:xfrm>
           <a:prstGeom prst="ellipse">
@@ -24499,7 +25944,7 @@
         </p:nvSpPr>
         <p:spPr>
           <a:xfrm>
-            <a:off x="3669746" y="4444955"/>
+            <a:off x="3712595" y="4134717"/>
             <a:ext cx="621046" cy="602080"/>
           </a:xfrm>
           <a:prstGeom prst="ellipse">
@@ -24557,7 +26002,7 @@
         </p:nvSpPr>
         <p:spPr>
           <a:xfrm>
-            <a:off x="4342408" y="1057752"/>
+            <a:off x="4289261" y="1030592"/>
             <a:ext cx="7073020" cy="593176"/>
           </a:xfrm>
           <a:prstGeom prst="rect">
@@ -24696,7 +26141,7 @@
         </p:nvSpPr>
         <p:spPr>
           <a:xfrm>
-            <a:off x="4346057" y="2648836"/>
+            <a:off x="4336051" y="2581734"/>
             <a:ext cx="7886672" cy="838884"/>
           </a:xfrm>
           <a:prstGeom prst="rect">
@@ -24753,7 +26198,7 @@
         </p:nvSpPr>
         <p:spPr>
           <a:xfrm>
-            <a:off x="4342408" y="3505051"/>
+            <a:off x="4317047" y="3420618"/>
             <a:ext cx="7338032" cy="665760"/>
           </a:xfrm>
           <a:prstGeom prst="rect">
@@ -24801,8 +26246,8 @@
         </p:nvSpPr>
         <p:spPr>
           <a:xfrm>
-            <a:off x="4354108" y="4264159"/>
-            <a:ext cx="7727239" cy="907941"/>
+            <a:off x="4289261" y="4187038"/>
+            <a:ext cx="7727239" cy="707886"/>
           </a:xfrm>
           <a:prstGeom prst="rect">
             <a:avLst/>
@@ -24851,7 +26296,7 @@
         </p:nvSpPr>
         <p:spPr>
           <a:xfrm>
-            <a:off x="3669746" y="5457315"/>
+            <a:off x="3711326" y="4911100"/>
             <a:ext cx="621046" cy="602080"/>
           </a:xfrm>
           <a:prstGeom prst="ellipse">
@@ -24909,8 +26354,8 @@
         </p:nvSpPr>
         <p:spPr>
           <a:xfrm>
-            <a:off x="4317047" y="5251126"/>
-            <a:ext cx="7168325" cy="1337161"/>
+            <a:off x="4289261" y="5016809"/>
+            <a:ext cx="7168325" cy="507831"/>
           </a:xfrm>
           <a:prstGeom prst="rect">
             <a:avLst/>
@@ -24926,17 +26371,6 @@
             <a:pPr lvl="0" algn="just"/>
             <a:r>
               <a:rPr lang="en-US" sz="1400" b="1" dirty="0"/>
-              <a:t>Chatting: </a:t>
-            </a:r>
-            <a:r>
-              <a:rPr lang="en-US" sz="1300" dirty="0"/>
-              <a:t>The app also includes a chat to facilitate communication between students and the university.</a:t>
-            </a:r>
-          </a:p>
-          <a:p>
-            <a:pPr lvl="0" algn="just"/>
-            <a:r>
-              <a:rPr lang="en-US" sz="1400" b="1" dirty="0"/>
               <a:t>Dashboard: </a:t>
             </a:r>
             <a:r>
@@ -24944,22 +26378,103 @@
               <a:t>offer to the university clear visions of how many students paid and did not pay and the total amount they received, both from expenses, e-books, courses, and all other services</a:t>
             </a:r>
           </a:p>
+        </p:txBody>
+      </p:sp>
+      <p:sp>
+        <p:nvSpPr>
+          <p:cNvPr id="32" name="Oval 39">
+            <a:extLst>
+              <a:ext uri="{FF2B5EF4-FFF2-40B4-BE49-F238E27FC236}">
+                <a16:creationId xmlns:a16="http://schemas.microsoft.com/office/drawing/2014/main" id="{0EC840D2-0DB0-B298-218A-88BEA4D4EC95}"/>
+              </a:ext>
+            </a:extLst>
+          </p:cNvPr>
+          <p:cNvSpPr/>
+          <p:nvPr/>
+        </p:nvSpPr>
+        <p:spPr>
+          <a:xfrm>
+            <a:off x="3721362" y="5687481"/>
+            <a:ext cx="621046" cy="602080"/>
+          </a:xfrm>
+          <a:prstGeom prst="ellipse">
+            <a:avLst/>
+          </a:prstGeom>
+          <a:solidFill>
+            <a:srgbClr val="199ADD"/>
+          </a:solidFill>
+          <a:ln>
+            <a:noFill/>
+          </a:ln>
+        </p:spPr>
+        <p:style>
+          <a:lnRef idx="2">
+            <a:schemeClr val="accent1">
+              <a:shade val="50000"/>
+            </a:schemeClr>
+          </a:lnRef>
+          <a:fillRef idx="1">
+            <a:schemeClr val="accent1"/>
+          </a:fillRef>
+          <a:effectRef idx="0">
+            <a:schemeClr val="accent1"/>
+          </a:effectRef>
+          <a:fontRef idx="minor">
+            <a:schemeClr val="lt1"/>
+          </a:fontRef>
+        </p:style>
+        <p:txBody>
+          <a:bodyPr rtlCol="0" anchor="ctr"/>
+          <a:lstStyle/>
           <a:p>
-            <a:pPr>
-              <a:lnSpc>
-                <a:spcPct val="125000"/>
-              </a:lnSpc>
-            </a:pPr>
-            <a:endParaRPr lang="zh-CN" altLang="en-US" sz="1200" dirty="0">
-              <a:solidFill>
-                <a:schemeClr val="tx1">
-                  <a:lumMod val="75000"/>
-                  <a:lumOff val="25000"/>
-                </a:schemeClr>
-              </a:solidFill>
-              <a:latin typeface="Yeseva One" panose="00000500000000000000" pitchFamily="2" charset="0"/>
-              <a:ea typeface="字魂5号-无外润黑体" panose="00000500000000000000" pitchFamily="2" charset="-122"/>
-            </a:endParaRPr>
+            <a:pPr algn="ctr"/>
+            <a:r>
+              <a:rPr lang="en-US" sz="2800" dirty="0">
+                <a:latin typeface="Yeseva One" panose="00000500000000000000" pitchFamily="2" charset="0"/>
+                <a:ea typeface="字魂5号-无外润黑体" panose="00000500000000000000" pitchFamily="2" charset="-122"/>
+              </a:rPr>
+              <a:t>7</a:t>
+            </a:r>
+          </a:p>
+        </p:txBody>
+      </p:sp>
+      <p:sp>
+        <p:nvSpPr>
+          <p:cNvPr id="34" name="TextBox 33">
+            <a:extLst>
+              <a:ext uri="{FF2B5EF4-FFF2-40B4-BE49-F238E27FC236}">
+                <a16:creationId xmlns:a16="http://schemas.microsoft.com/office/drawing/2014/main" id="{4CC10C11-A1C2-16F1-BBD5-88735D13D219}"/>
+              </a:ext>
+            </a:extLst>
+          </p:cNvPr>
+          <p:cNvSpPr txBox="1"/>
+          <p:nvPr/>
+        </p:nvSpPr>
+        <p:spPr>
+          <a:xfrm>
+            <a:off x="4332372" y="5704562"/>
+            <a:ext cx="6119446" cy="523220"/>
+          </a:xfrm>
+          <a:prstGeom prst="rect">
+            <a:avLst/>
+          </a:prstGeom>
+          <a:noFill/>
+        </p:spPr>
+        <p:txBody>
+          <a:bodyPr wrap="square">
+            <a:spAutoFit/>
+          </a:bodyPr>
+          <a:lstStyle/>
+          <a:p>
+            <a:pPr algn="just"/>
+            <a:r>
+              <a:rPr lang="en-US" sz="1400" b="1" dirty="0"/>
+              <a:t>Chatting: </a:t>
+            </a:r>
+            <a:r>
+              <a:rPr lang="en-US" sz="1400" dirty="0"/>
+              <a:t>The app also includes a chat to facilitate communication between students and the university.</a:t>
+            </a:r>
           </a:p>
         </p:txBody>
       </p:sp>
@@ -25975,6 +27490,85 @@
                                         <p:cTn id="89" dur="500"/>
                                         <p:tgtEl>
                                           <p:spTgt spid="31"/>
+                                        </p:tgtEl>
+                                      </p:cBhvr>
+                                    </p:animEffect>
+                                  </p:childTnLst>
+                                </p:cTn>
+                              </p:par>
+                            </p:childTnLst>
+                          </p:cTn>
+                        </p:par>
+                        <p:par>
+                          <p:cTn id="90" fill="hold">
+                            <p:stCondLst>
+                              <p:cond delay="4000"/>
+                            </p:stCondLst>
+                            <p:childTnLst>
+                              <p:par>
+                                <p:cTn id="91" presetID="10" presetClass="entr" presetSubtype="0" fill="hold" grpId="0" nodeType="afterEffect">
+                                  <p:stCondLst>
+                                    <p:cond delay="0"/>
+                                  </p:stCondLst>
+                                  <p:childTnLst>
+                                    <p:set>
+                                      <p:cBhvr>
+                                        <p:cTn id="92" dur="1" fill="hold">
+                                          <p:stCondLst>
+                                            <p:cond delay="0"/>
+                                          </p:stCondLst>
+                                        </p:cTn>
+                                        <p:tgtEl>
+                                          <p:spTgt spid="32"/>
+                                        </p:tgtEl>
+                                        <p:attrNameLst>
+                                          <p:attrName>style.visibility</p:attrName>
+                                        </p:attrNameLst>
+                                      </p:cBhvr>
+                                      <p:to>
+                                        <p:strVal val="visible"/>
+                                      </p:to>
+                                    </p:set>
+                                    <p:animEffect transition="in" filter="fade">
+                                      <p:cBhvr>
+                                        <p:cTn id="93" dur="500"/>
+                                        <p:tgtEl>
+                                          <p:spTgt spid="32"/>
+                                        </p:tgtEl>
+                                      </p:cBhvr>
+                                    </p:animEffect>
+                                  </p:childTnLst>
+                                </p:cTn>
+                              </p:par>
+                              <p:par>
+                                <p:cTn id="94" presetID="10" presetClass="entr" presetSubtype="0" fill="hold" grpId="0" nodeType="withEffect">
+                                  <p:stCondLst>
+                                    <p:cond delay="0"/>
+                                  </p:stCondLst>
+                                  <p:childTnLst>
+                                    <p:set>
+                                      <p:cBhvr>
+                                        <p:cTn id="95" dur="1" fill="hold">
+                                          <p:stCondLst>
+                                            <p:cond delay="0"/>
+                                          </p:stCondLst>
+                                        </p:cTn>
+                                        <p:tgtEl>
+                                          <p:spTgt spid="34"/>
+                                        </p:tgtEl>
+                                        <p:attrNameLst>
+                                          <p:attrName>style.visibility</p:attrName>
+                                        </p:attrNameLst>
+                                      </p:cBhvr>
+                                      <p:to>
+                                        <p:strVal val="visible"/>
+                                      </p:to>
+                                    </p:set>
+                                    <p:animEffect transition="in" filter="fade">
+                                      <p:cBhvr>
+                                        <p:cTn id="96" dur="500"/>
+                                        <p:tgtEl>
+                                          <p:spTgt spid="34"/>
                                         </p:tgtEl>
                                       </p:cBhvr>
                                     </p:animEffect>
@@ -26034,6 +27628,8 @@
       <p:bldP spid="29" grpId="0"/>
       <p:bldP spid="30" grpId="0" animBg="1"/>
       <p:bldP spid="31" grpId="0"/>
+      <p:bldP spid="32" grpId="0" animBg="1"/>
+      <p:bldP spid="34" grpId="0"/>
     </p:bldLst>
   </p:timing>
 </p:sld>
@@ -28089,7 +29685,7 @@
           <p:nvPr/>
         </p:nvPicPr>
         <p:blipFill>
-          <a:blip r:embed="rId3">
+          <a:blip r:embed="rId3" cstate="hqprint">
             <a:extLst>
               <a:ext uri="{28A0092B-C50C-407E-A947-70E740481C1C}">
                 <a14:useLocalDpi xmlns:a14="http://schemas.microsoft.com/office/drawing/2010/main" val="0"/>
@@ -28125,7 +29721,7 @@
           <p:nvPr/>
         </p:nvPicPr>
         <p:blipFill>
-          <a:blip r:embed="rId4">
+          <a:blip r:embed="rId4" cstate="hqprint">
             <a:extLst>
               <a:ext uri="{28A0092B-C50C-407E-A947-70E740481C1C}">
                 <a14:useLocalDpi xmlns:a14="http://schemas.microsoft.com/office/drawing/2010/main" val="0"/>
@@ -28161,7 +29757,7 @@
           <p:nvPr/>
         </p:nvPicPr>
         <p:blipFill>
-          <a:blip r:embed="rId5">
+          <a:blip r:embed="rId5" cstate="hqprint">
             <a:extLst>
               <a:ext uri="{28A0092B-C50C-407E-A947-70E740481C1C}">
                 <a14:useLocalDpi xmlns:a14="http://schemas.microsoft.com/office/drawing/2010/main" val="0"/>
@@ -28197,7 +29793,7 @@
           <p:nvPr/>
         </p:nvPicPr>
         <p:blipFill>
-          <a:blip r:embed="rId6">
+          <a:blip r:embed="rId6" cstate="hqprint">
             <a:extLst>
               <a:ext uri="{28A0092B-C50C-407E-A947-70E740481C1C}">
                 <a14:useLocalDpi xmlns:a14="http://schemas.microsoft.com/office/drawing/2010/main" val="0"/>
@@ -30029,7 +31625,7 @@
           <p:nvPr/>
         </p:nvPicPr>
         <p:blipFill>
-          <a:blip r:embed="rId2">
+          <a:blip r:embed="rId2" cstate="hqprint">
             <a:extLst>
               <a:ext uri="{28A0092B-C50C-407E-A947-70E740481C1C}">
                 <a14:useLocalDpi xmlns:a14="http://schemas.microsoft.com/office/drawing/2010/main" val="0"/>
@@ -30065,7 +31661,7 @@
           <p:nvPr/>
         </p:nvPicPr>
         <p:blipFill>
-          <a:blip r:embed="rId3">
+          <a:blip r:embed="rId3" cstate="hqprint">
             <a:extLst>
               <a:ext uri="{28A0092B-C50C-407E-A947-70E740481C1C}">
                 <a14:useLocalDpi xmlns:a14="http://schemas.microsoft.com/office/drawing/2010/main" val="0"/>
@@ -30101,7 +31697,7 @@
           <p:nvPr/>
         </p:nvPicPr>
         <p:blipFill>
-          <a:blip r:embed="rId4">
+          <a:blip r:embed="rId4" cstate="hqprint">
             <a:extLst>
               <a:ext uri="{28A0092B-C50C-407E-A947-70E740481C1C}">
                 <a14:useLocalDpi xmlns:a14="http://schemas.microsoft.com/office/drawing/2010/main" val="0"/>
@@ -30137,7 +31733,7 @@
           <p:nvPr/>
         </p:nvPicPr>
         <p:blipFill>
-          <a:blip r:embed="rId5">
+          <a:blip r:embed="rId5" cstate="hqprint">
             <a:extLst>
               <a:ext uri="{28A0092B-C50C-407E-A947-70E740481C1C}">
                 <a14:useLocalDpi xmlns:a14="http://schemas.microsoft.com/office/drawing/2010/main" val="0"/>

</xml_diff>